<commit_message>
Updates T2-S05 e T2S06
</commit_message>
<xml_diff>
--- a/aulas/t/SCO-T2-S05-S06.pptx
+++ b/aulas/t/SCO-T2-S05-S06.pptx
@@ -8397,7 +8397,7 @@
         <p:spPr bwMode="auto">
           <a:xfrm>
             <a:off x="540000" y="841276"/>
-            <a:ext cx="8208464" cy="3968702"/>
+            <a:ext cx="8208464" cy="4190301"/>
           </a:xfrm>
           <a:prstGeom prst="rect">
             <a:avLst/>
@@ -8756,7 +8756,7 @@
                 <a:latin typeface="Courier New" panose="02070309020205020404" pitchFamily="49" charset="0"/>
                 <a:cs typeface="Courier New" panose="02070309020205020404" pitchFamily="49" charset="0"/>
               </a:rPr>
-              <a:t>p10l2-01a.o: p10l2-01a.S </a:t>
+              <a:t>p10l2-01.o: p10l2-01.S </a:t>
             </a:r>
             <a:r>
               <a:rPr lang="pt-PT" sz="1200" i="0" dirty="0" err="1">
@@ -8823,8 +8823,22 @@
                 <a:latin typeface="Courier New" panose="02070309020205020404" pitchFamily="49" charset="0"/>
                 <a:cs typeface="Courier New" panose="02070309020205020404" pitchFamily="49" charset="0"/>
               </a:rPr>
-              <a:t>${AS} p10l2-01a.S -o p10l2-01a.o ${ASFLAGS}</a:t>
-            </a:r>
+              <a:t>${AS} p10l2-01.S -o p10l2-01.o ${ASFLAGS}</a:t>
+            </a:r>
+          </a:p>
+          <a:p>
+            <a:pPr marL="179388" lvl="1" algn="just" defTabSz="624078">
+              <a:lnSpc>
+                <a:spcPct val="120000"/>
+              </a:lnSpc>
+            </a:pPr>
+            <a:endParaRPr lang="pt-PT" sz="1200" i="0" dirty="0">
+              <a:solidFill>
+                <a:srgbClr val="0070C0"/>
+              </a:solidFill>
+              <a:latin typeface="Courier New" panose="02070309020205020404" pitchFamily="49" charset="0"/>
+              <a:cs typeface="Courier New" panose="02070309020205020404" pitchFamily="49" charset="0"/>
+            </a:endParaRPr>
           </a:p>
           <a:p>
             <a:pPr marL="179388" lvl="1" algn="just" defTabSz="624078">
@@ -11083,7 +11097,7 @@
         <p:spPr bwMode="auto">
           <a:xfrm>
             <a:off x="540000" y="841276"/>
-            <a:ext cx="8208464" cy="4241662"/>
+            <a:ext cx="8208464" cy="3946196"/>
           </a:xfrm>
           <a:prstGeom prst="rect">
             <a:avLst/>
@@ -11132,15 +11146,47 @@
             </a:pPr>
             <a:r>
               <a:rPr lang="pt-PT" sz="1600" b="0" i="0" dirty="0"/>
-              <a:t>Para utilizar uma função em C, sem parâmetros, base “saltar para endereço da função. O modulo em C deve ser compilado sem ser linkado (opção </a:t>
-            </a:r>
-            <a:r>
-              <a:rPr lang="pt-PT" sz="1600" i="0" dirty="0"/>
-              <a:t>–c</a:t>
+              <a:t>Para utilizar uma função em </a:t>
+            </a:r>
+            <a:r>
+              <a:rPr lang="pt-PT" sz="1600" b="0" dirty="0" err="1"/>
+              <a:t>assembly</a:t>
             </a:r>
             <a:r>
               <a:rPr lang="pt-PT" sz="1600" b="0" i="0" dirty="0"/>
-              <a:t> do compilador de C) para produzir o módulo objeto respetivo; </a:t>
+              <a:t>, deve exportar a </a:t>
+            </a:r>
+            <a:r>
+              <a:rPr lang="pt-PT" sz="1600" b="0" dirty="0" err="1"/>
+              <a:t>label</a:t>
+            </a:r>
+            <a:r>
+              <a:rPr lang="pt-PT" sz="1600" b="0" i="0" dirty="0"/>
+              <a:t> da função para o exterior (“</a:t>
+            </a:r>
+            <a:r>
+              <a:rPr lang="pt-PT" sz="1600" i="0" dirty="0">
+                <a:solidFill>
+                  <a:schemeClr val="accent2"/>
+                </a:solidFill>
+                <a:latin typeface="Courier New" panose="02070309020205020404" pitchFamily="49" charset="0"/>
+                <a:cs typeface="Courier New" panose="02070309020205020404" pitchFamily="49" charset="0"/>
+              </a:rPr>
+              <a:t>.global </a:t>
+            </a:r>
+            <a:r>
+              <a:rPr lang="pt-PT" sz="1600" i="0" dirty="0" err="1">
+                <a:solidFill>
+                  <a:schemeClr val="accent2"/>
+                </a:solidFill>
+                <a:latin typeface="Courier New" panose="02070309020205020404" pitchFamily="49" charset="0"/>
+                <a:cs typeface="Courier New" panose="02070309020205020404" pitchFamily="49" charset="0"/>
+              </a:rPr>
+              <a:t>func_address</a:t>
+            </a:r>
+            <a:r>
+              <a:rPr lang="pt-PT" sz="1600" b="0" i="0" dirty="0"/>
+              <a:t>”); </a:t>
             </a:r>
           </a:p>
           <a:p>
@@ -11153,15 +11199,85 @@
             </a:pPr>
             <a:r>
               <a:rPr lang="pt-PT" sz="1600" b="0" i="0" dirty="0"/>
-              <a:t>No exemplo seguinte o código C contém duas funções, uma sem parâmetros mas que utiliza outra função de C da biblioteca standard de C (</a:t>
-            </a:r>
-            <a:r>
-              <a:rPr lang="pt-PT" sz="1600" i="0" dirty="0" err="1"/>
-              <a:t>puts</a:t>
+              <a:t>Colocar a diretiva “</a:t>
+            </a:r>
+            <a:r>
+              <a:rPr lang="pt-PT" sz="1600" i="0" dirty="0">
+                <a:solidFill>
+                  <a:schemeClr val="accent2"/>
+                </a:solidFill>
+                <a:latin typeface="Courier New" panose="02070309020205020404" pitchFamily="49" charset="0"/>
+                <a:cs typeface="Courier New" panose="02070309020205020404" pitchFamily="49" charset="0"/>
+              </a:rPr>
+              <a:t>.</a:t>
+            </a:r>
+            <a:r>
+              <a:rPr lang="pt-PT" sz="1600" i="0" dirty="0" err="1">
+                <a:solidFill>
+                  <a:schemeClr val="accent2"/>
+                </a:solidFill>
+                <a:latin typeface="Courier New" panose="02070309020205020404" pitchFamily="49" charset="0"/>
+                <a:cs typeface="Courier New" panose="02070309020205020404" pitchFamily="49" charset="0"/>
+              </a:rPr>
+              <a:t>type</a:t>
+            </a:r>
+            <a:r>
+              <a:rPr lang="pt-PT" sz="1600" i="0" dirty="0">
+                <a:solidFill>
+                  <a:schemeClr val="accent2"/>
+                </a:solidFill>
+                <a:latin typeface="Courier New" panose="02070309020205020404" pitchFamily="49" charset="0"/>
+                <a:cs typeface="Courier New" panose="02070309020205020404" pitchFamily="49" charset="0"/>
+              </a:rPr>
+              <a:t> </a:t>
+            </a:r>
+            <a:r>
+              <a:rPr lang="pt-PT" sz="1600" i="0" dirty="0" err="1">
+                <a:solidFill>
+                  <a:schemeClr val="accent2"/>
+                </a:solidFill>
+                <a:latin typeface="Courier New" panose="02070309020205020404" pitchFamily="49" charset="0"/>
+                <a:cs typeface="Courier New" panose="02070309020205020404" pitchFamily="49" charset="0"/>
+              </a:rPr>
+              <a:t>func_address</a:t>
+            </a:r>
+            <a:r>
+              <a:rPr lang="pt-PT" sz="1600" i="0" dirty="0">
+                <a:solidFill>
+                  <a:schemeClr val="accent2"/>
+                </a:solidFill>
+                <a:latin typeface="Courier New" panose="02070309020205020404" pitchFamily="49" charset="0"/>
+                <a:cs typeface="Courier New" panose="02070309020205020404" pitchFamily="49" charset="0"/>
+              </a:rPr>
+              <a:t>, %</a:t>
+            </a:r>
+            <a:r>
+              <a:rPr lang="pt-PT" sz="1600" i="0" dirty="0" err="1">
+                <a:solidFill>
+                  <a:schemeClr val="accent2"/>
+                </a:solidFill>
+                <a:latin typeface="Courier New" panose="02070309020205020404" pitchFamily="49" charset="0"/>
+                <a:cs typeface="Courier New" panose="02070309020205020404" pitchFamily="49" charset="0"/>
+              </a:rPr>
+              <a:t>function</a:t>
             </a:r>
             <a:r>
               <a:rPr lang="pt-PT" sz="1600" b="0" i="0" dirty="0"/>
-              <a:t>);</a:t>
+              <a:t>” para indicar que “</a:t>
+            </a:r>
+            <a:r>
+              <a:rPr lang="pt-PT" sz="1600" i="0" dirty="0" err="1">
+                <a:solidFill>
+                  <a:schemeClr val="accent2"/>
+                </a:solidFill>
+                <a:latin typeface="Courier New" panose="02070309020205020404" pitchFamily="49" charset="0"/>
+                <a:cs typeface="Courier New" panose="02070309020205020404" pitchFamily="49" charset="0"/>
+              </a:rPr>
+              <a:t>func_address</a:t>
+            </a:r>
+            <a:r>
+              <a:rPr lang="pt-PT" sz="1600" b="0" i="0" dirty="0"/>
+              <a:t>” pode ser invocada em módulos objeto criados de código C;</a:t>
             </a:r>
           </a:p>
           <a:p>
@@ -11174,43 +11290,55 @@
             </a:pPr>
             <a:r>
               <a:rPr lang="pt-PT" sz="1600" b="0" i="0" dirty="0"/>
-              <a:t>Para poder utilizar o código máquina da função </a:t>
-            </a:r>
-            <a:r>
-              <a:rPr lang="pt-PT" sz="1600" i="0" dirty="0" err="1"/>
-              <a:t>puts</a:t>
+              <a:t>Colocar o código das funções entre as diretivas “</a:t>
+            </a:r>
+            <a:r>
+              <a:rPr lang="pt-PT" sz="1600" i="0" dirty="0">
+                <a:solidFill>
+                  <a:schemeClr val="accent2"/>
+                </a:solidFill>
+                <a:latin typeface="Courier New" panose="02070309020205020404" pitchFamily="49" charset="0"/>
+                <a:cs typeface="Courier New" panose="02070309020205020404" pitchFamily="49" charset="0"/>
+              </a:rPr>
+              <a:t>.</a:t>
+            </a:r>
+            <a:r>
+              <a:rPr lang="pt-PT" sz="1600" i="0" dirty="0" err="1">
+                <a:solidFill>
+                  <a:schemeClr val="accent2"/>
+                </a:solidFill>
+                <a:latin typeface="Courier New" panose="02070309020205020404" pitchFamily="49" charset="0"/>
+                <a:cs typeface="Courier New" panose="02070309020205020404" pitchFamily="49" charset="0"/>
+              </a:rPr>
+              <a:t>fnstart</a:t>
             </a:r>
             <a:r>
               <a:rPr lang="pt-PT" sz="1600" b="0" i="0" dirty="0"/>
-              <a:t> devemos indicar ao </a:t>
-            </a:r>
-            <a:r>
-              <a:rPr lang="pt-PT" sz="1600" b="0" dirty="0" err="1"/>
-              <a:t>linker</a:t>
+              <a:t>” e ” </a:t>
+            </a:r>
+            <a:r>
+              <a:rPr lang="pt-PT" sz="1600" i="0" dirty="0">
+                <a:solidFill>
+                  <a:schemeClr val="accent2"/>
+                </a:solidFill>
+                <a:latin typeface="Courier New" panose="02070309020205020404" pitchFamily="49" charset="0"/>
+                <a:cs typeface="Courier New" panose="02070309020205020404" pitchFamily="49" charset="0"/>
+              </a:rPr>
+              <a:t>.</a:t>
+            </a:r>
+            <a:r>
+              <a:rPr lang="pt-PT" sz="1600" i="0" dirty="0" err="1">
+                <a:solidFill>
+                  <a:schemeClr val="accent2"/>
+                </a:solidFill>
+                <a:latin typeface="Courier New" panose="02070309020205020404" pitchFamily="49" charset="0"/>
+                <a:cs typeface="Courier New" panose="02070309020205020404" pitchFamily="49" charset="0"/>
+              </a:rPr>
+              <a:t>fnend</a:t>
             </a:r>
             <a:r>
               <a:rPr lang="pt-PT" sz="1600" b="0" i="0" dirty="0"/>
-              <a:t> para utilizar a biblioteca standard de C que a contém, com a opção</a:t>
-            </a:r>
-            <a:r>
-              <a:rPr lang="pt-PT" sz="1600" i="0" dirty="0"/>
-              <a:t> -</a:t>
-            </a:r>
-            <a:r>
-              <a:rPr lang="pt-PT" sz="1600" i="0" dirty="0" err="1"/>
-              <a:t>lc</a:t>
-            </a:r>
-            <a:r>
-              <a:rPr lang="pt-PT" sz="1600" b="0" i="0" dirty="0"/>
-              <a:t> para o </a:t>
-            </a:r>
-            <a:r>
-              <a:rPr lang="pt-PT" sz="1600" i="0" dirty="0" err="1"/>
-              <a:t>gcc</a:t>
-            </a:r>
-            <a:r>
-              <a:rPr lang="pt-PT" sz="1600" b="0" i="0" dirty="0"/>
-              <a:t>;</a:t>
+              <a:t>”;</a:t>
             </a:r>
           </a:p>
           <a:p>
@@ -11223,15 +11351,63 @@
             </a:pPr>
             <a:r>
               <a:rPr lang="pt-PT" sz="1600" b="0" i="0" dirty="0"/>
-              <a:t>Podemos utilizar outras funções da biblioteca standard de C como o </a:t>
-            </a:r>
-            <a:r>
-              <a:rPr lang="pt-PT" sz="1600" i="0" dirty="0" err="1"/>
-              <a:t>printf</a:t>
+              <a:t>Não é obrigatório colocar o código na secção de “</a:t>
+            </a:r>
+            <a:r>
+              <a:rPr lang="pt-PT" sz="1600" i="0" dirty="0">
+                <a:solidFill>
+                  <a:schemeClr val="accent2"/>
+                </a:solidFill>
+                <a:latin typeface="Courier New" panose="02070309020205020404" pitchFamily="49" charset="0"/>
+                <a:cs typeface="Courier New" panose="02070309020205020404" pitchFamily="49" charset="0"/>
+              </a:rPr>
+              <a:t>.</a:t>
+            </a:r>
+            <a:r>
+              <a:rPr lang="pt-PT" sz="1600" i="0" dirty="0" err="1">
+                <a:solidFill>
+                  <a:schemeClr val="accent2"/>
+                </a:solidFill>
+                <a:latin typeface="Courier New" panose="02070309020205020404" pitchFamily="49" charset="0"/>
+                <a:cs typeface="Courier New" panose="02070309020205020404" pitchFamily="49" charset="0"/>
+              </a:rPr>
+              <a:t>text</a:t>
             </a:r>
             <a:r>
               <a:rPr lang="pt-PT" sz="1600" b="0" i="0" dirty="0"/>
-              <a:t>;</a:t>
+              <a:t>”. Se o módulo só tem funções em </a:t>
+            </a:r>
+            <a:r>
+              <a:rPr lang="pt-PT" sz="1600" b="0" dirty="0" err="1"/>
+              <a:t>assembly</a:t>
+            </a:r>
+            <a:r>
+              <a:rPr lang="pt-PT" sz="1600" b="0" i="0" dirty="0"/>
+              <a:t>, pode ser omitido a secção “</a:t>
+            </a:r>
+            <a:r>
+              <a:rPr lang="pt-PT" sz="1600" i="0" dirty="0">
+                <a:solidFill>
+                  <a:schemeClr val="accent2"/>
+                </a:solidFill>
+                <a:latin typeface="Courier New" panose="02070309020205020404" pitchFamily="49" charset="0"/>
+                <a:cs typeface="Courier New" panose="02070309020205020404" pitchFamily="49" charset="0"/>
+              </a:rPr>
+              <a:t>.</a:t>
+            </a:r>
+            <a:r>
+              <a:rPr lang="pt-PT" sz="1600" i="0" dirty="0" err="1">
+                <a:solidFill>
+                  <a:schemeClr val="accent2"/>
+                </a:solidFill>
+                <a:latin typeface="Courier New" panose="02070309020205020404" pitchFamily="49" charset="0"/>
+                <a:cs typeface="Courier New" panose="02070309020205020404" pitchFamily="49" charset="0"/>
+              </a:rPr>
+              <a:t>text</a:t>
+            </a:r>
+            <a:r>
+              <a:rPr lang="pt-PT" sz="1600" b="0" i="0" dirty="0"/>
+              <a:t>”.</a:t>
             </a:r>
           </a:p>
           <a:p>

</xml_diff>